<commit_message>
Presentation refinement + Acknowledgements + Contents of the Medium + Cover + Selected works section completed
</commit_message>
<xml_diff>
--- a/presentation/presentation.pptx
+++ b/presentation/presentation.pptx
@@ -6,9 +6,9 @@
   </p:sldMasterIdLst>
   <p:sldIdLst>
     <p:sldId id="256" r:id="rId2"/>
-    <p:sldId id="257" r:id="rId3"/>
+    <p:sldId id="269" r:id="rId3"/>
     <p:sldId id="258" r:id="rId4"/>
-    <p:sldId id="259" r:id="rId5"/>
+    <p:sldId id="268" r:id="rId5"/>
     <p:sldId id="260" r:id="rId6"/>
     <p:sldId id="261" r:id="rId7"/>
     <p:sldId id="263" r:id="rId8"/>
@@ -114,6 +114,11 @@
       </a:defRPr>
     </a:lvl9pPr>
   </p:defaultTextStyle>
+  <p:extLst>
+    <p:ext uri="{EFAFB233-063F-42B5-8137-9DF3F51BA10A}">
+      <p15:sldGuideLst xmlns:p15="http://schemas.microsoft.com/office/powerpoint/2012/main"/>
+    </p:ext>
+  </p:extLst>
 </p:presentation>
 </file>
 
@@ -1014,9 +1019,10 @@
             </a:lnSpc>
           </a:pPr>
           <a:r>
-            <a:rPr lang="en-US" sz="1600" dirty="0"/>
+            <a:rPr lang="en-US" sz="1600"/>
             <a:t>Tries to mimic the mechanisms in the human ear</a:t>
           </a:r>
+          <a:endParaRPr lang="en-US" sz="1600" dirty="0"/>
         </a:p>
       </dgm:t>
     </dgm:pt>
@@ -1055,9 +1061,10 @@
             </a:lnSpc>
           </a:pPr>
           <a:r>
-            <a:rPr lang="en-US" sz="1600" dirty="0"/>
+            <a:rPr lang="en-US" sz="1600"/>
             <a:t>The goal is to find an “ideal binary mask”</a:t>
           </a:r>
+          <a:endParaRPr lang="en-US" sz="1600" dirty="0"/>
         </a:p>
       </dgm:t>
     </dgm:pt>
@@ -1320,41 +1327,41 @@
     </dgm:pt>
   </dgm:ptLst>
   <dgm:cxnLst>
-    <dgm:cxn modelId="{B9B5190A-F897-44F4-B3F2-E9EC4160EED9}" type="presOf" srcId="{D33A8949-846F-4BB5-821D-401A4A5F1310}" destId="{9AEE7AA0-33C6-40CD-97A0-A34CBBFF18FD}" srcOrd="0" destOrd="0" presId="urn:microsoft.com/office/officeart/2018/2/layout/IconLabelList"/>
+    <dgm:cxn modelId="{8E6F2603-D4E8-468D-ABD8-3615929E333A}" type="presOf" srcId="{D33A8949-846F-4BB5-821D-401A4A5F1310}" destId="{9AEE7AA0-33C6-40CD-97A0-A34CBBFF18FD}" srcOrd="0" destOrd="0" presId="urn:microsoft.com/office/officeart/2018/2/layout/IconLabelList"/>
+    <dgm:cxn modelId="{3ED6C519-11B3-4A7C-8D98-20EF73D0C1AF}" type="presOf" srcId="{AAC6FF7D-1684-4C5A-B8E5-A0112229C83C}" destId="{6D1C726C-FE00-4600-90A5-096E7FE49A50}" srcOrd="0" destOrd="0" presId="urn:microsoft.com/office/officeart/2018/2/layout/IconLabelList"/>
     <dgm:cxn modelId="{08785F25-DDD6-4660-86EF-2920E390D194}" srcId="{AAC6FF7D-1684-4C5A-B8E5-A0112229C83C}" destId="{5A08C07F-D8DE-425F-BCED-B5F4C352C2DD}" srcOrd="3" destOrd="0" parTransId="{842D814A-D467-4B8A-97D0-D5DC501C17F6}" sibTransId="{238750EB-722C-470A-BE01-D487DF8768D6}"/>
-    <dgm:cxn modelId="{6B6EFC27-D2BE-46ED-BA0F-EECF93471628}" type="presOf" srcId="{AEE1494E-11F4-400E-BA7E-BB1BD162946D}" destId="{11E01538-7646-402A-B6CF-B07EA907C8C2}" srcOrd="0" destOrd="0" presId="urn:microsoft.com/office/officeart/2018/2/layout/IconLabelList"/>
     <dgm:cxn modelId="{16936A3B-CB0E-4032-A5F3-AFF703469816}" srcId="{AAC6FF7D-1684-4C5A-B8E5-A0112229C83C}" destId="{4EA59156-3596-44D7-8E3C-1FC7DB7435F5}" srcOrd="4" destOrd="0" parTransId="{A6913A42-333E-4597-962C-1F11B2C2FFE8}" sibTransId="{02B4623D-FC8E-40BC-AB8E-B82258ECDC92}"/>
-    <dgm:cxn modelId="{8D704152-5400-420B-8B7F-6FFA98D771F8}" type="presOf" srcId="{5A08C07F-D8DE-425F-BCED-B5F4C352C2DD}" destId="{B9DAE6F3-DDA6-45BF-AE97-9646A2EA2C6F}" srcOrd="0" destOrd="0" presId="urn:microsoft.com/office/officeart/2018/2/layout/IconLabelList"/>
+    <dgm:cxn modelId="{C9B9B75B-0860-486E-B763-A3675143459B}" type="presOf" srcId="{AEE1494E-11F4-400E-BA7E-BB1BD162946D}" destId="{11E01538-7646-402A-B6CF-B07EA907C8C2}" srcOrd="0" destOrd="0" presId="urn:microsoft.com/office/officeart/2018/2/layout/IconLabelList"/>
+    <dgm:cxn modelId="{328B6460-AAA4-427A-9A4C-65275C5B8CD8}" type="presOf" srcId="{D176A2BD-C3E9-41AC-9BA6-1BC438E7B287}" destId="{D0B1045A-6A40-4E2A-ADFF-CCCF3EFE9597}" srcOrd="0" destOrd="0" presId="urn:microsoft.com/office/officeart/2018/2/layout/IconLabelList"/>
+    <dgm:cxn modelId="{C74D8746-9942-4F07-B3AB-1668A9C641FF}" type="presOf" srcId="{5A08C07F-D8DE-425F-BCED-B5F4C352C2DD}" destId="{B9DAE6F3-DDA6-45BF-AE97-9646A2EA2C6F}" srcOrd="0" destOrd="0" presId="urn:microsoft.com/office/officeart/2018/2/layout/IconLabelList"/>
+    <dgm:cxn modelId="{7D71B173-5160-471F-A2B7-3D9DB723EA22}" type="presOf" srcId="{4EA59156-3596-44D7-8E3C-1FC7DB7435F5}" destId="{BE4385D1-6B02-41BA-86D1-C454E7BCCEFD}" srcOrd="0" destOrd="0" presId="urn:microsoft.com/office/officeart/2018/2/layout/IconLabelList"/>
     <dgm:cxn modelId="{C46DB07B-8A05-4AAF-A8E9-129CC6510EA2}" srcId="{AAC6FF7D-1684-4C5A-B8E5-A0112229C83C}" destId="{D33A8949-846F-4BB5-821D-401A4A5F1310}" srcOrd="2" destOrd="0" parTransId="{D4042C89-DB6B-44C8-87E3-3FB06A4B9B6F}" sibTransId="{454AE17C-EE54-4E5E-8CB2-E760F5F9DA9A}"/>
     <dgm:cxn modelId="{011C2FA2-DAC4-48A7-9009-4C263309FEAB}" srcId="{AAC6FF7D-1684-4C5A-B8E5-A0112229C83C}" destId="{D176A2BD-C3E9-41AC-9BA6-1BC438E7B287}" srcOrd="1" destOrd="0" parTransId="{00F5617A-40FE-4626-9098-CB1ECCC0E244}" sibTransId="{4D5A2B6F-DF0F-4E75-80C4-20F3FC40A29A}"/>
-    <dgm:cxn modelId="{0E2AFFA8-8B10-4918-BC59-11B35EDACD3F}" type="presOf" srcId="{4EA59156-3596-44D7-8E3C-1FC7DB7435F5}" destId="{BE4385D1-6B02-41BA-86D1-C454E7BCCEFD}" srcOrd="0" destOrd="0" presId="urn:microsoft.com/office/officeart/2018/2/layout/IconLabelList"/>
-    <dgm:cxn modelId="{D68840D6-752B-45DB-956E-CEB6B2857E7C}" type="presOf" srcId="{D176A2BD-C3E9-41AC-9BA6-1BC438E7B287}" destId="{D0B1045A-6A40-4E2A-ADFF-CCCF3EFE9597}" srcOrd="0" destOrd="0" presId="urn:microsoft.com/office/officeart/2018/2/layout/IconLabelList"/>
-    <dgm:cxn modelId="{5BF6F0FC-4AC5-4CCD-8C0F-653F311487CA}" type="presOf" srcId="{AAC6FF7D-1684-4C5A-B8E5-A0112229C83C}" destId="{6D1C726C-FE00-4600-90A5-096E7FE49A50}" srcOrd="0" destOrd="0" presId="urn:microsoft.com/office/officeart/2018/2/layout/IconLabelList"/>
     <dgm:cxn modelId="{2179CBFE-FD26-4D8A-AB51-E6A3A4B08EC1}" srcId="{AAC6FF7D-1684-4C5A-B8E5-A0112229C83C}" destId="{AEE1494E-11F4-400E-BA7E-BB1BD162946D}" srcOrd="0" destOrd="0" parTransId="{72EA7D55-662B-4A5C-A8FF-C730C45913C6}" sibTransId="{FD0E9103-D6BA-4C58-A05F-B34673FFE374}"/>
-    <dgm:cxn modelId="{3069F111-4A9B-4525-B440-78A0C4F86981}" type="presParOf" srcId="{6D1C726C-FE00-4600-90A5-096E7FE49A50}" destId="{08729A9D-1BEB-4793-8F8A-0FA169207A96}" srcOrd="0" destOrd="0" presId="urn:microsoft.com/office/officeart/2018/2/layout/IconLabelList"/>
-    <dgm:cxn modelId="{A5D65FC6-4A5B-429B-8523-C2AA269E329D}" type="presParOf" srcId="{08729A9D-1BEB-4793-8F8A-0FA169207A96}" destId="{DF52E403-3705-4044-8A3E-74E51CA9981A}" srcOrd="0" destOrd="0" presId="urn:microsoft.com/office/officeart/2018/2/layout/IconLabelList"/>
-    <dgm:cxn modelId="{E5B64F31-1A45-4FC2-B4BD-17DE9A4EFFF8}" type="presParOf" srcId="{08729A9D-1BEB-4793-8F8A-0FA169207A96}" destId="{53BAA7E3-0959-425B-A58F-DF6CE02BA600}" srcOrd="1" destOrd="0" presId="urn:microsoft.com/office/officeart/2018/2/layout/IconLabelList"/>
-    <dgm:cxn modelId="{B4D40439-5CFF-4439-B054-64CB037C0A23}" type="presParOf" srcId="{08729A9D-1BEB-4793-8F8A-0FA169207A96}" destId="{11E01538-7646-402A-B6CF-B07EA907C8C2}" srcOrd="2" destOrd="0" presId="urn:microsoft.com/office/officeart/2018/2/layout/IconLabelList"/>
-    <dgm:cxn modelId="{F682E7A8-9D52-4262-8A9C-3B2BD4DEEA7F}" type="presParOf" srcId="{6D1C726C-FE00-4600-90A5-096E7FE49A50}" destId="{FC86E435-7E5A-42B1-89F1-E942D31BD785}" srcOrd="1" destOrd="0" presId="urn:microsoft.com/office/officeart/2018/2/layout/IconLabelList"/>
-    <dgm:cxn modelId="{C1E86836-4D9E-4137-89B2-A671266E4AD0}" type="presParOf" srcId="{6D1C726C-FE00-4600-90A5-096E7FE49A50}" destId="{CC542038-CF1D-42FE-8F4E-533577979167}" srcOrd="2" destOrd="0" presId="urn:microsoft.com/office/officeart/2018/2/layout/IconLabelList"/>
-    <dgm:cxn modelId="{96F961CF-ABF9-4E1F-A2D8-999E157A5AA8}" type="presParOf" srcId="{CC542038-CF1D-42FE-8F4E-533577979167}" destId="{0A85F50E-D462-46F6-9F56-4D500ED0E6BE}" srcOrd="0" destOrd="0" presId="urn:microsoft.com/office/officeart/2018/2/layout/IconLabelList"/>
-    <dgm:cxn modelId="{EDF62290-B5A9-4C25-9054-BB9C98BA15EE}" type="presParOf" srcId="{CC542038-CF1D-42FE-8F4E-533577979167}" destId="{FEF0E055-605D-463F-BC51-83795B9C8173}" srcOrd="1" destOrd="0" presId="urn:microsoft.com/office/officeart/2018/2/layout/IconLabelList"/>
-    <dgm:cxn modelId="{3BD8500B-E675-4D3F-866A-D69A0D4C3117}" type="presParOf" srcId="{CC542038-CF1D-42FE-8F4E-533577979167}" destId="{D0B1045A-6A40-4E2A-ADFF-CCCF3EFE9597}" srcOrd="2" destOrd="0" presId="urn:microsoft.com/office/officeart/2018/2/layout/IconLabelList"/>
-    <dgm:cxn modelId="{0A3CD30B-3E01-4763-8BEF-9ED34B27C65E}" type="presParOf" srcId="{6D1C726C-FE00-4600-90A5-096E7FE49A50}" destId="{200BD16A-BC63-44F0-89F4-62D45BCB3CCA}" srcOrd="3" destOrd="0" presId="urn:microsoft.com/office/officeart/2018/2/layout/IconLabelList"/>
-    <dgm:cxn modelId="{72773A76-1339-4FE3-844B-123CAA40EA54}" type="presParOf" srcId="{6D1C726C-FE00-4600-90A5-096E7FE49A50}" destId="{41F1143E-40DD-4F01-BDF5-8DDE10C516B8}" srcOrd="4" destOrd="0" presId="urn:microsoft.com/office/officeart/2018/2/layout/IconLabelList"/>
-    <dgm:cxn modelId="{0C939108-F558-43DD-8344-988C64D0659E}" type="presParOf" srcId="{41F1143E-40DD-4F01-BDF5-8DDE10C516B8}" destId="{836E8715-E073-4AFC-A508-529D05856827}" srcOrd="0" destOrd="0" presId="urn:microsoft.com/office/officeart/2018/2/layout/IconLabelList"/>
-    <dgm:cxn modelId="{CE862222-A551-4E0E-9E16-74DF607FA227}" type="presParOf" srcId="{41F1143E-40DD-4F01-BDF5-8DDE10C516B8}" destId="{1140C279-EF98-4B7A-A154-7975A85D3B28}" srcOrd="1" destOrd="0" presId="urn:microsoft.com/office/officeart/2018/2/layout/IconLabelList"/>
-    <dgm:cxn modelId="{BC466734-BB16-4497-A89C-F5E4EB237213}" type="presParOf" srcId="{41F1143E-40DD-4F01-BDF5-8DDE10C516B8}" destId="{9AEE7AA0-33C6-40CD-97A0-A34CBBFF18FD}" srcOrd="2" destOrd="0" presId="urn:microsoft.com/office/officeart/2018/2/layout/IconLabelList"/>
-    <dgm:cxn modelId="{19AF8C71-B9A8-4502-8DCF-C2AF1EAC32B4}" type="presParOf" srcId="{6D1C726C-FE00-4600-90A5-096E7FE49A50}" destId="{49AC7DDB-2C32-41FD-B066-7F3EBF5A750A}" srcOrd="5" destOrd="0" presId="urn:microsoft.com/office/officeart/2018/2/layout/IconLabelList"/>
-    <dgm:cxn modelId="{BE59AADF-C025-4702-A82E-F70B4C8883A7}" type="presParOf" srcId="{6D1C726C-FE00-4600-90A5-096E7FE49A50}" destId="{EAB90F90-790C-4937-BC5E-9ACA858B8D8F}" srcOrd="6" destOrd="0" presId="urn:microsoft.com/office/officeart/2018/2/layout/IconLabelList"/>
-    <dgm:cxn modelId="{E6F38896-A015-4810-A2D6-8E3F338B236F}" type="presParOf" srcId="{EAB90F90-790C-4937-BC5E-9ACA858B8D8F}" destId="{E95D422F-9857-4405-86BD-F433FBD0C10D}" srcOrd="0" destOrd="0" presId="urn:microsoft.com/office/officeart/2018/2/layout/IconLabelList"/>
-    <dgm:cxn modelId="{FBAFCFF9-4A50-44AD-9109-FF366D884743}" type="presParOf" srcId="{EAB90F90-790C-4937-BC5E-9ACA858B8D8F}" destId="{DC05989D-E912-4A46-993B-0DF5E51D282B}" srcOrd="1" destOrd="0" presId="urn:microsoft.com/office/officeart/2018/2/layout/IconLabelList"/>
-    <dgm:cxn modelId="{EE039441-1BA9-461E-A7DB-430A918CA6EE}" type="presParOf" srcId="{EAB90F90-790C-4937-BC5E-9ACA858B8D8F}" destId="{B9DAE6F3-DDA6-45BF-AE97-9646A2EA2C6F}" srcOrd="2" destOrd="0" presId="urn:microsoft.com/office/officeart/2018/2/layout/IconLabelList"/>
-    <dgm:cxn modelId="{0A9E2319-A01F-425B-8B91-D9FFC0D123E0}" type="presParOf" srcId="{6D1C726C-FE00-4600-90A5-096E7FE49A50}" destId="{C99538A6-207F-4A0D-AE8D-47BB0E5DF0DA}" srcOrd="7" destOrd="0" presId="urn:microsoft.com/office/officeart/2018/2/layout/IconLabelList"/>
-    <dgm:cxn modelId="{202714FF-4124-4082-AD31-2356421D4B04}" type="presParOf" srcId="{6D1C726C-FE00-4600-90A5-096E7FE49A50}" destId="{B5285EEB-1CD2-4A21-883D-9356716DE76B}" srcOrd="8" destOrd="0" presId="urn:microsoft.com/office/officeart/2018/2/layout/IconLabelList"/>
-    <dgm:cxn modelId="{AFBA769F-8A5D-4C73-B5B8-4164EE92DD10}" type="presParOf" srcId="{B5285EEB-1CD2-4A21-883D-9356716DE76B}" destId="{A29B392A-5C72-46BB-B488-033FAA0C19A5}" srcOrd="0" destOrd="0" presId="urn:microsoft.com/office/officeart/2018/2/layout/IconLabelList"/>
-    <dgm:cxn modelId="{A7D3E0E0-151D-406D-9EB0-A27C1C57E2EE}" type="presParOf" srcId="{B5285EEB-1CD2-4A21-883D-9356716DE76B}" destId="{D4AD9313-CD11-463D-B10D-D86FC3421806}" srcOrd="1" destOrd="0" presId="urn:microsoft.com/office/officeart/2018/2/layout/IconLabelList"/>
-    <dgm:cxn modelId="{456914D8-99A4-4209-A575-1FAE9FBF0130}" type="presParOf" srcId="{B5285EEB-1CD2-4A21-883D-9356716DE76B}" destId="{BE4385D1-6B02-41BA-86D1-C454E7BCCEFD}" srcOrd="2" destOrd="0" presId="urn:microsoft.com/office/officeart/2018/2/layout/IconLabelList"/>
+    <dgm:cxn modelId="{A2812EBC-884C-4F25-AF78-8AEAD17043F1}" type="presParOf" srcId="{6D1C726C-FE00-4600-90A5-096E7FE49A50}" destId="{08729A9D-1BEB-4793-8F8A-0FA169207A96}" srcOrd="0" destOrd="0" presId="urn:microsoft.com/office/officeart/2018/2/layout/IconLabelList"/>
+    <dgm:cxn modelId="{F35909B6-7205-4FD8-8D9A-BAC6B6ED3CCF}" type="presParOf" srcId="{08729A9D-1BEB-4793-8F8A-0FA169207A96}" destId="{DF52E403-3705-4044-8A3E-74E51CA9981A}" srcOrd="0" destOrd="0" presId="urn:microsoft.com/office/officeart/2018/2/layout/IconLabelList"/>
+    <dgm:cxn modelId="{25051EF7-C480-4D83-B98D-D2C357692079}" type="presParOf" srcId="{08729A9D-1BEB-4793-8F8A-0FA169207A96}" destId="{53BAA7E3-0959-425B-A58F-DF6CE02BA600}" srcOrd="1" destOrd="0" presId="urn:microsoft.com/office/officeart/2018/2/layout/IconLabelList"/>
+    <dgm:cxn modelId="{D5E772F6-ED1B-423B-82CA-DD8A65D3F107}" type="presParOf" srcId="{08729A9D-1BEB-4793-8F8A-0FA169207A96}" destId="{11E01538-7646-402A-B6CF-B07EA907C8C2}" srcOrd="2" destOrd="0" presId="urn:microsoft.com/office/officeart/2018/2/layout/IconLabelList"/>
+    <dgm:cxn modelId="{30862053-0B37-4176-B46F-96E944A5BF7B}" type="presParOf" srcId="{6D1C726C-FE00-4600-90A5-096E7FE49A50}" destId="{FC86E435-7E5A-42B1-89F1-E942D31BD785}" srcOrd="1" destOrd="0" presId="urn:microsoft.com/office/officeart/2018/2/layout/IconLabelList"/>
+    <dgm:cxn modelId="{876F56A0-9AA5-481E-8E9D-E055F445A034}" type="presParOf" srcId="{6D1C726C-FE00-4600-90A5-096E7FE49A50}" destId="{CC542038-CF1D-42FE-8F4E-533577979167}" srcOrd="2" destOrd="0" presId="urn:microsoft.com/office/officeart/2018/2/layout/IconLabelList"/>
+    <dgm:cxn modelId="{21A7CD7C-3EF9-4FF1-A3D2-0E5AA2F950F8}" type="presParOf" srcId="{CC542038-CF1D-42FE-8F4E-533577979167}" destId="{0A85F50E-D462-46F6-9F56-4D500ED0E6BE}" srcOrd="0" destOrd="0" presId="urn:microsoft.com/office/officeart/2018/2/layout/IconLabelList"/>
+    <dgm:cxn modelId="{7FDDA79F-739C-4205-AF3B-65B0668BBF7C}" type="presParOf" srcId="{CC542038-CF1D-42FE-8F4E-533577979167}" destId="{FEF0E055-605D-463F-BC51-83795B9C8173}" srcOrd="1" destOrd="0" presId="urn:microsoft.com/office/officeart/2018/2/layout/IconLabelList"/>
+    <dgm:cxn modelId="{BC189068-1FB9-497C-8439-17D96894377F}" type="presParOf" srcId="{CC542038-CF1D-42FE-8F4E-533577979167}" destId="{D0B1045A-6A40-4E2A-ADFF-CCCF3EFE9597}" srcOrd="2" destOrd="0" presId="urn:microsoft.com/office/officeart/2018/2/layout/IconLabelList"/>
+    <dgm:cxn modelId="{B6116076-6163-48DC-A5C5-324E9EBC272B}" type="presParOf" srcId="{6D1C726C-FE00-4600-90A5-096E7FE49A50}" destId="{200BD16A-BC63-44F0-89F4-62D45BCB3CCA}" srcOrd="3" destOrd="0" presId="urn:microsoft.com/office/officeart/2018/2/layout/IconLabelList"/>
+    <dgm:cxn modelId="{D5996B09-6BB8-41AE-A1D9-E9FB2D3EEF87}" type="presParOf" srcId="{6D1C726C-FE00-4600-90A5-096E7FE49A50}" destId="{41F1143E-40DD-4F01-BDF5-8DDE10C516B8}" srcOrd="4" destOrd="0" presId="urn:microsoft.com/office/officeart/2018/2/layout/IconLabelList"/>
+    <dgm:cxn modelId="{DC0C03A3-90F7-46DE-B199-8BCB506C96F2}" type="presParOf" srcId="{41F1143E-40DD-4F01-BDF5-8DDE10C516B8}" destId="{836E8715-E073-4AFC-A508-529D05856827}" srcOrd="0" destOrd="0" presId="urn:microsoft.com/office/officeart/2018/2/layout/IconLabelList"/>
+    <dgm:cxn modelId="{CA9F9FAB-EBF2-4887-9A7C-73890F793C94}" type="presParOf" srcId="{41F1143E-40DD-4F01-BDF5-8DDE10C516B8}" destId="{1140C279-EF98-4B7A-A154-7975A85D3B28}" srcOrd="1" destOrd="0" presId="urn:microsoft.com/office/officeart/2018/2/layout/IconLabelList"/>
+    <dgm:cxn modelId="{9657E7B4-570B-4112-A361-BAEEFB3862CD}" type="presParOf" srcId="{41F1143E-40DD-4F01-BDF5-8DDE10C516B8}" destId="{9AEE7AA0-33C6-40CD-97A0-A34CBBFF18FD}" srcOrd="2" destOrd="0" presId="urn:microsoft.com/office/officeart/2018/2/layout/IconLabelList"/>
+    <dgm:cxn modelId="{E1664817-B23C-4B32-8401-536E41A49C8E}" type="presParOf" srcId="{6D1C726C-FE00-4600-90A5-096E7FE49A50}" destId="{49AC7DDB-2C32-41FD-B066-7F3EBF5A750A}" srcOrd="5" destOrd="0" presId="urn:microsoft.com/office/officeart/2018/2/layout/IconLabelList"/>
+    <dgm:cxn modelId="{686D20BE-A3D2-4939-B08A-075453F110BF}" type="presParOf" srcId="{6D1C726C-FE00-4600-90A5-096E7FE49A50}" destId="{EAB90F90-790C-4937-BC5E-9ACA858B8D8F}" srcOrd="6" destOrd="0" presId="urn:microsoft.com/office/officeart/2018/2/layout/IconLabelList"/>
+    <dgm:cxn modelId="{C0658FDA-F31A-4AE3-9EB6-24B4C0869D71}" type="presParOf" srcId="{EAB90F90-790C-4937-BC5E-9ACA858B8D8F}" destId="{E95D422F-9857-4405-86BD-F433FBD0C10D}" srcOrd="0" destOrd="0" presId="urn:microsoft.com/office/officeart/2018/2/layout/IconLabelList"/>
+    <dgm:cxn modelId="{735753E1-59E7-448B-9DDB-C2C624CDBB3F}" type="presParOf" srcId="{EAB90F90-790C-4937-BC5E-9ACA858B8D8F}" destId="{DC05989D-E912-4A46-993B-0DF5E51D282B}" srcOrd="1" destOrd="0" presId="urn:microsoft.com/office/officeart/2018/2/layout/IconLabelList"/>
+    <dgm:cxn modelId="{25F2A1F4-0EF2-4706-8F37-A15370481A84}" type="presParOf" srcId="{EAB90F90-790C-4937-BC5E-9ACA858B8D8F}" destId="{B9DAE6F3-DDA6-45BF-AE97-9646A2EA2C6F}" srcOrd="2" destOrd="0" presId="urn:microsoft.com/office/officeart/2018/2/layout/IconLabelList"/>
+    <dgm:cxn modelId="{FFF1D816-4949-45DF-9EF1-AE429A8FE49E}" type="presParOf" srcId="{6D1C726C-FE00-4600-90A5-096E7FE49A50}" destId="{C99538A6-207F-4A0D-AE8D-47BB0E5DF0DA}" srcOrd="7" destOrd="0" presId="urn:microsoft.com/office/officeart/2018/2/layout/IconLabelList"/>
+    <dgm:cxn modelId="{3FA293FB-DF06-4992-A8E7-0360F82178E4}" type="presParOf" srcId="{6D1C726C-FE00-4600-90A5-096E7FE49A50}" destId="{B5285EEB-1CD2-4A21-883D-9356716DE76B}" srcOrd="8" destOrd="0" presId="urn:microsoft.com/office/officeart/2018/2/layout/IconLabelList"/>
+    <dgm:cxn modelId="{6D120FED-8982-4C68-B418-1E21DCADDC5F}" type="presParOf" srcId="{B5285EEB-1CD2-4A21-883D-9356716DE76B}" destId="{A29B392A-5C72-46BB-B488-033FAA0C19A5}" srcOrd="0" destOrd="0" presId="urn:microsoft.com/office/officeart/2018/2/layout/IconLabelList"/>
+    <dgm:cxn modelId="{82F9A850-CB39-4405-9F8C-770AF89C2CA1}" type="presParOf" srcId="{B5285EEB-1CD2-4A21-883D-9356716DE76B}" destId="{D4AD9313-CD11-463D-B10D-D86FC3421806}" srcOrd="1" destOrd="0" presId="urn:microsoft.com/office/officeart/2018/2/layout/IconLabelList"/>
+    <dgm:cxn modelId="{B594A410-2D3C-4B72-9A5D-BB40EBA1FAAD}" type="presParOf" srcId="{B5285EEB-1CD2-4A21-883D-9356716DE76B}" destId="{BE4385D1-6B02-41BA-86D1-C454E7BCCEFD}" srcOrd="2" destOrd="0" presId="urn:microsoft.com/office/officeart/2018/2/layout/IconLabelList"/>
   </dgm:cxnLst>
   <dgm:bg/>
   <dgm:whole/>
@@ -1828,9 +1835,10 @@
             <a:buNone/>
           </a:pPr>
           <a:r>
-            <a:rPr lang="en-US" sz="1600" kern="1200" dirty="0"/>
+            <a:rPr lang="en-US" sz="1600" kern="1200"/>
             <a:t>Tries to mimic the mechanisms in the human ear</a:t>
           </a:r>
+          <a:endParaRPr lang="en-US" sz="1600" kern="1200" dirty="0"/>
         </a:p>
       </dsp:txBody>
       <dsp:txXfrm>
@@ -1944,9 +1952,10 @@
             <a:buNone/>
           </a:pPr>
           <a:r>
-            <a:rPr lang="en-US" sz="1600" kern="1200" dirty="0"/>
+            <a:rPr lang="en-US" sz="1600" kern="1200"/>
             <a:t>The goal is to find an “ideal binary mask”</a:t>
           </a:r>
+          <a:endParaRPr lang="en-US" sz="1600" kern="1200" dirty="0"/>
         </a:p>
       </dsp:txBody>
       <dsp:txXfrm>
@@ -3408,7 +3417,7 @@
           <a:p>
             <a:fld id="{CE20EC0F-44AC-4090-9B28-F1AEE8B15CC4}" type="datetimeFigureOut">
               <a:rPr lang="cs-CZ" smtClean="0"/>
-              <a:t>29.04.2022</a:t>
+              <a:t>03.05.2022</a:t>
             </a:fld>
             <a:endParaRPr lang="cs-CZ"/>
           </a:p>
@@ -3616,7 +3625,7 @@
           <a:p>
             <a:fld id="{CE20EC0F-44AC-4090-9B28-F1AEE8B15CC4}" type="datetimeFigureOut">
               <a:rPr lang="cs-CZ" smtClean="0"/>
-              <a:t>29.04.2022</a:t>
+              <a:t>03.05.2022</a:t>
             </a:fld>
             <a:endParaRPr lang="cs-CZ"/>
           </a:p>
@@ -3872,7 +3881,7 @@
           <a:p>
             <a:fld id="{CE20EC0F-44AC-4090-9B28-F1AEE8B15CC4}" type="datetimeFigureOut">
               <a:rPr lang="cs-CZ" smtClean="0"/>
-              <a:t>29.04.2022</a:t>
+              <a:t>03.05.2022</a:t>
             </a:fld>
             <a:endParaRPr lang="cs-CZ"/>
           </a:p>
@@ -4046,7 +4055,7 @@
           <a:p>
             <a:fld id="{CE20EC0F-44AC-4090-9B28-F1AEE8B15CC4}" type="datetimeFigureOut">
               <a:rPr lang="cs-CZ" smtClean="0"/>
-              <a:t>29.04.2022</a:t>
+              <a:t>03.05.2022</a:t>
             </a:fld>
             <a:endParaRPr lang="cs-CZ"/>
           </a:p>
@@ -4389,7 +4398,7 @@
           <a:p>
             <a:fld id="{CE20EC0F-44AC-4090-9B28-F1AEE8B15CC4}" type="datetimeFigureOut">
               <a:rPr lang="cs-CZ" smtClean="0"/>
-              <a:t>29.04.2022</a:t>
+              <a:t>03.05.2022</a:t>
             </a:fld>
             <a:endParaRPr lang="cs-CZ"/>
           </a:p>
@@ -4664,7 +4673,7 @@
           <a:p>
             <a:fld id="{CE20EC0F-44AC-4090-9B28-F1AEE8B15CC4}" type="datetimeFigureOut">
               <a:rPr lang="cs-CZ" smtClean="0"/>
-              <a:t>29.04.2022</a:t>
+              <a:t>03.05.2022</a:t>
             </a:fld>
             <a:endParaRPr lang="cs-CZ"/>
           </a:p>
@@ -5043,7 +5052,7 @@
           <a:p>
             <a:fld id="{CE20EC0F-44AC-4090-9B28-F1AEE8B15CC4}" type="datetimeFigureOut">
               <a:rPr lang="cs-CZ" smtClean="0"/>
-              <a:t>29.04.2022</a:t>
+              <a:t>03.05.2022</a:t>
             </a:fld>
             <a:endParaRPr lang="cs-CZ"/>
           </a:p>
@@ -5161,7 +5170,7 @@
           <a:p>
             <a:fld id="{CE20EC0F-44AC-4090-9B28-F1AEE8B15CC4}" type="datetimeFigureOut">
               <a:rPr lang="cs-CZ" smtClean="0"/>
-              <a:t>29.04.2022</a:t>
+              <a:t>03.05.2022</a:t>
             </a:fld>
             <a:endParaRPr lang="cs-CZ"/>
           </a:p>
@@ -5332,7 +5341,7 @@
           <a:p>
             <a:fld id="{CE20EC0F-44AC-4090-9B28-F1AEE8B15CC4}" type="datetimeFigureOut">
               <a:rPr lang="cs-CZ" smtClean="0"/>
-              <a:t>29.04.2022</a:t>
+              <a:t>03.05.2022</a:t>
             </a:fld>
             <a:endParaRPr lang="cs-CZ"/>
           </a:p>
@@ -5686,7 +5695,7 @@
           <a:p>
             <a:fld id="{CE20EC0F-44AC-4090-9B28-F1AEE8B15CC4}" type="datetimeFigureOut">
               <a:rPr lang="cs-CZ" smtClean="0"/>
-              <a:t>29.04.2022</a:t>
+              <a:t>03.05.2022</a:t>
             </a:fld>
             <a:endParaRPr lang="cs-CZ"/>
           </a:p>
@@ -6068,7 +6077,7 @@
           <a:p>
             <a:fld id="{CE20EC0F-44AC-4090-9B28-F1AEE8B15CC4}" type="datetimeFigureOut">
               <a:rPr lang="cs-CZ" smtClean="0"/>
-              <a:t>29.04.2022</a:t>
+              <a:t>03.05.2022</a:t>
             </a:fld>
             <a:endParaRPr lang="cs-CZ"/>
           </a:p>
@@ -6355,7 +6364,7 @@
           <a:p>
             <a:fld id="{CE20EC0F-44AC-4090-9B28-F1AEE8B15CC4}" type="datetimeFigureOut">
               <a:rPr lang="cs-CZ" smtClean="0"/>
-              <a:t>29.04.2022</a:t>
+              <a:t>03.05.2022</a:t>
             </a:fld>
             <a:endParaRPr lang="cs-CZ"/>
           </a:p>
@@ -6968,7 +6977,7 @@
         <p:spPr>
           <a:xfrm>
             <a:off x="3048000" y="4683292"/>
-            <a:ext cx="6096000" cy="646331"/>
+            <a:ext cx="6096000" cy="1138773"/>
           </a:xfrm>
           <a:prstGeom prst="rect">
             <a:avLst/>
@@ -7016,6 +7025,69 @@
                 </a:solidFill>
               </a:rPr>
               <a:t>, 2022</a:t>
+            </a:r>
+          </a:p>
+          <a:p>
+            <a:pPr algn="ctr"/>
+            <a:endParaRPr lang="en-US" sz="1600" dirty="0"/>
+          </a:p>
+          <a:p>
+            <a:pPr algn="ctr"/>
+            <a:r>
+              <a:rPr lang="en-US" sz="1600" dirty="0">
+                <a:solidFill>
+                  <a:schemeClr val="tx1"/>
+                </a:solidFill>
+              </a:rPr>
+              <a:t>Supervisor: Ing. Mgr. </a:t>
+            </a:r>
+            <a:r>
+              <a:rPr lang="en-US" sz="1600" dirty="0" err="1">
+                <a:solidFill>
+                  <a:schemeClr val="tx1"/>
+                </a:solidFill>
+              </a:rPr>
+              <a:t>Ladislava</a:t>
+            </a:r>
+            <a:r>
+              <a:rPr lang="en-US" sz="1600" dirty="0">
+                <a:solidFill>
+                  <a:schemeClr val="tx1"/>
+                </a:solidFill>
+              </a:rPr>
+              <a:t> </a:t>
+            </a:r>
+            <a:r>
+              <a:rPr lang="en-US" sz="1600" dirty="0" err="1">
+                <a:solidFill>
+                  <a:schemeClr val="tx1"/>
+                </a:solidFill>
+              </a:rPr>
+              <a:t>Smítková</a:t>
+            </a:r>
+            <a:r>
+              <a:rPr lang="en-US" sz="1600" dirty="0">
+                <a:solidFill>
+                  <a:schemeClr val="tx1"/>
+                </a:solidFill>
+              </a:rPr>
+              <a:t> </a:t>
+            </a:r>
+            <a:r>
+              <a:rPr lang="en-US" sz="1600" dirty="0" err="1">
+                <a:solidFill>
+                  <a:schemeClr val="tx1"/>
+                </a:solidFill>
+              </a:rPr>
+              <a:t>Janků</a:t>
+            </a:r>
+            <a:r>
+              <a:rPr lang="en-US" sz="1600" dirty="0">
+                <a:solidFill>
+                  <a:schemeClr val="tx1"/>
+                </a:solidFill>
+              </a:rPr>
+              <a:t>, Ph.D.</a:t>
             </a:r>
             <a:endParaRPr lang="cs-CZ" sz="1600" dirty="0">
               <a:solidFill>
@@ -7424,7 +7496,7 @@
           <p:cNvPr id="2" name="Title 1">
             <a:extLst>
               <a:ext uri="{FF2B5EF4-FFF2-40B4-BE49-F238E27FC236}">
-                <a16:creationId xmlns:a16="http://schemas.microsoft.com/office/drawing/2014/main" id="{26AB655C-D263-F642-F79C-94CC2EB4959F}"/>
+                <a16:creationId xmlns:a16="http://schemas.microsoft.com/office/drawing/2014/main" id="{C152E651-D2E8-634C-3623-E6A1B15F63A5}"/>
               </a:ext>
             </a:extLst>
           </p:cNvPr>
@@ -7442,7 +7514,7 @@
           <a:p>
             <a:r>
               <a:rPr lang="en-US" dirty="0"/>
-              <a:t>Summary</a:t>
+              <a:t>Objectives</a:t>
             </a:r>
             <a:endParaRPr lang="cs-CZ" dirty="0"/>
           </a:p>
@@ -7450,10 +7522,10 @@
       </p:sp>
       <p:sp>
         <p:nvSpPr>
-          <p:cNvPr id="3" name="Content Placeholder 2">
+          <p:cNvPr id="4" name="Content Placeholder 2">
             <a:extLst>
               <a:ext uri="{FF2B5EF4-FFF2-40B4-BE49-F238E27FC236}">
-                <a16:creationId xmlns:a16="http://schemas.microsoft.com/office/drawing/2014/main" id="{D2D4D465-C96C-64B5-35E3-7A820F9E5C3E}"/>
+                <a16:creationId xmlns:a16="http://schemas.microsoft.com/office/drawing/2014/main" id="{B723F998-7A55-F46E-6D6D-A79DEAECA687}"/>
               </a:ext>
             </a:extLst>
           </p:cNvPr>
@@ -7466,7 +7538,7 @@
         </p:nvSpPr>
         <p:spPr>
           <a:xfrm>
-            <a:off x="1097280" y="2548037"/>
+            <a:off x="1097280" y="2331733"/>
             <a:ext cx="10058400" cy="4023360"/>
           </a:xfrm>
         </p:spPr>
@@ -7480,7 +7552,7 @@
             </a:pPr>
             <a:r>
               <a:rPr lang="en-US" sz="2600" dirty="0"/>
-              <a:t>What is CASA?</a:t>
+              <a:t>Research the field of CASA, its applications and goals</a:t>
             </a:r>
           </a:p>
           <a:p>
@@ -7490,7 +7562,7 @@
             </a:pPr>
             <a:r>
               <a:rPr lang="en-US" sz="2600" dirty="0"/>
-              <a:t>Typical architecture of a CASA system</a:t>
+              <a:t>Study existing works</a:t>
             </a:r>
           </a:p>
           <a:p>
@@ -7500,7 +7572,7 @@
             </a:pPr>
             <a:r>
               <a:rPr lang="en-US" sz="2600" dirty="0"/>
-              <a:t>Implemented model</a:t>
+              <a:t>Implement a CASA system to process monophonic piano music</a:t>
             </a:r>
           </a:p>
           <a:p>
@@ -7510,7 +7582,7 @@
             </a:pPr>
             <a:r>
               <a:rPr lang="en-US" sz="2600" dirty="0"/>
-              <a:t>Experiments</a:t>
+              <a:t>Experiment with the implemented system</a:t>
             </a:r>
           </a:p>
           <a:p>
@@ -7525,7 +7597,7 @@
     </p:spTree>
     <p:extLst>
       <p:ext uri="{BB962C8B-B14F-4D97-AF65-F5344CB8AC3E}">
-        <p14:creationId xmlns:p14="http://schemas.microsoft.com/office/powerpoint/2010/main" val="2014954248"/>
+        <p14:creationId xmlns:p14="http://schemas.microsoft.com/office/powerpoint/2010/main" val="2929665949"/>
       </p:ext>
     </p:extLst>
   </p:cSld>
@@ -7579,7 +7651,7 @@
           <a:lstStyle/>
           <a:p>
             <a:r>
-              <a:rPr lang="en-US" dirty="0"/>
+              <a:rPr lang="en-US"/>
               <a:t>What is CASA?</a:t>
             </a:r>
             <a:endParaRPr lang="cs-CZ" dirty="0"/>
@@ -7602,7 +7674,7 @@
             <p:ph idx="4294967295"/>
             <p:extLst>
               <p:ext uri="{D42A27DB-BD31-4B8C-83A1-F6EECF244321}">
-                <p14:modId xmlns:p14="http://schemas.microsoft.com/office/powerpoint/2010/main" val="2520550563"/>
+                <p14:modId xmlns:p14="http://schemas.microsoft.com/office/powerpoint/2010/main" val="3106741483"/>
               </p:ext>
             </p:extLst>
           </p:nvPr>
@@ -7652,7 +7724,7 @@
           <p:cNvPr id="2" name="Title 1">
             <a:extLst>
               <a:ext uri="{FF2B5EF4-FFF2-40B4-BE49-F238E27FC236}">
-                <a16:creationId xmlns:a16="http://schemas.microsoft.com/office/drawing/2014/main" id="{4C313B2E-47F2-446B-71FD-115F93EF9E92}"/>
+                <a16:creationId xmlns:a16="http://schemas.microsoft.com/office/drawing/2014/main" id="{61E8D8EA-459F-FB02-92D5-66E29B60E535}"/>
               </a:ext>
             </a:extLst>
           </p:cNvPr>
@@ -7663,51 +7735,290 @@
             <p:ph type="title"/>
           </p:nvPr>
         </p:nvSpPr>
+        <p:spPr/>
+        <p:txBody>
+          <a:bodyPr/>
+          <a:lstStyle/>
+          <a:p>
+            <a:r>
+              <a:rPr lang="en-US" dirty="0"/>
+              <a:t>Typical Architecture</a:t>
+            </a:r>
+            <a:endParaRPr lang="cs-CZ" dirty="0"/>
+          </a:p>
+        </p:txBody>
+      </p:sp>
+      <p:sp>
+        <p:nvSpPr>
+          <p:cNvPr id="5" name="Content Placeholder 2">
+            <a:extLst>
+              <a:ext uri="{FF2B5EF4-FFF2-40B4-BE49-F238E27FC236}">
+                <a16:creationId xmlns:a16="http://schemas.microsoft.com/office/drawing/2014/main" id="{2FC6BF34-55BF-9FF0-0FC7-7E5CCB79885C}"/>
+              </a:ext>
+            </a:extLst>
+          </p:cNvPr>
+          <p:cNvSpPr txBox="1">
+            <a:spLocks/>
+          </p:cNvSpPr>
+          <p:nvPr/>
+        </p:nvSpPr>
         <p:spPr>
           <a:xfrm>
-            <a:off x="1097280" y="266938"/>
-            <a:ext cx="10058400" cy="1450757"/>
+            <a:off x="1097280" y="2331727"/>
+            <a:ext cx="10058400" cy="4023360"/>
           </a:xfrm>
+          <a:prstGeom prst="rect">
+            <a:avLst/>
+          </a:prstGeom>
         </p:spPr>
         <p:txBody>
           <a:bodyPr/>
-          <a:lstStyle/>
-          <a:p>
-            <a:r>
-              <a:rPr lang="en-US" dirty="0"/>
-              <a:t>Typical Architecture</a:t>
-            </a:r>
-            <a:endParaRPr lang="cs-CZ" dirty="0"/>
-          </a:p>
-        </p:txBody>
-      </p:sp>
-      <p:sp>
-        <p:nvSpPr>
-          <p:cNvPr id="3" name="Content Placeholder 2">
-            <a:extLst>
-              <a:ext uri="{FF2B5EF4-FFF2-40B4-BE49-F238E27FC236}">
-                <a16:creationId xmlns:a16="http://schemas.microsoft.com/office/drawing/2014/main" id="{BA6CB801-B57B-4DDB-A15F-F679BB3AE1E1}"/>
-              </a:ext>
-            </a:extLst>
-          </p:cNvPr>
-          <p:cNvSpPr>
-            <a:spLocks noGrp="1"/>
-          </p:cNvSpPr>
-          <p:nvPr>
-            <p:ph idx="1"/>
-          </p:nvPr>
-        </p:nvSpPr>
-        <p:spPr>
-          <a:xfrm>
-            <a:off x="1097280" y="2335928"/>
-            <a:ext cx="10058400" cy="4023360"/>
-          </a:xfrm>
-        </p:spPr>
-        <p:txBody>
-          <a:bodyPr>
-            <a:normAutofit/>
-          </a:bodyPr>
-          <a:lstStyle/>
+          <a:lstStyle>
+            <a:lvl1pPr marL="91440" indent="-91440" algn="l" defTabSz="914400" rtl="0" eaLnBrk="1" latinLnBrk="0" hangingPunct="1">
+              <a:lnSpc>
+                <a:spcPct val="90000"/>
+              </a:lnSpc>
+              <a:spcBef>
+                <a:spcPts val="1200"/>
+              </a:spcBef>
+              <a:spcAft>
+                <a:spcPts val="200"/>
+              </a:spcAft>
+              <a:buClr>
+                <a:schemeClr val="accent1"/>
+              </a:buClr>
+              <a:buSzPct val="100000"/>
+              <a:buFont typeface="Calibri" panose="020F0502020204030204" pitchFamily="34" charset="0"/>
+              <a:buChar char=" "/>
+              <a:defRPr sz="2000" kern="1200">
+                <a:solidFill>
+                  <a:schemeClr val="tx1">
+                    <a:lumMod val="75000"/>
+                    <a:lumOff val="25000"/>
+                  </a:schemeClr>
+                </a:solidFill>
+                <a:latin typeface="+mn-lt"/>
+                <a:ea typeface="+mn-ea"/>
+                <a:cs typeface="+mn-cs"/>
+              </a:defRPr>
+            </a:lvl1pPr>
+            <a:lvl2pPr marL="384048" indent="-182880" algn="l" defTabSz="914400" rtl="0" eaLnBrk="1" latinLnBrk="0" hangingPunct="1">
+              <a:lnSpc>
+                <a:spcPct val="90000"/>
+              </a:lnSpc>
+              <a:spcBef>
+                <a:spcPts val="200"/>
+              </a:spcBef>
+              <a:spcAft>
+                <a:spcPts val="400"/>
+              </a:spcAft>
+              <a:buClr>
+                <a:schemeClr val="accent1"/>
+              </a:buClr>
+              <a:buFont typeface="Calibri" pitchFamily="34" charset="0"/>
+              <a:buChar char="◦"/>
+              <a:defRPr sz="1800" kern="1200">
+                <a:solidFill>
+                  <a:schemeClr val="tx1">
+                    <a:lumMod val="75000"/>
+                    <a:lumOff val="25000"/>
+                  </a:schemeClr>
+                </a:solidFill>
+                <a:latin typeface="+mn-lt"/>
+                <a:ea typeface="+mn-ea"/>
+                <a:cs typeface="+mn-cs"/>
+              </a:defRPr>
+            </a:lvl2pPr>
+            <a:lvl3pPr marL="566928" indent="-182880" algn="l" defTabSz="914400" rtl="0" eaLnBrk="1" latinLnBrk="0" hangingPunct="1">
+              <a:lnSpc>
+                <a:spcPct val="90000"/>
+              </a:lnSpc>
+              <a:spcBef>
+                <a:spcPts val="200"/>
+              </a:spcBef>
+              <a:spcAft>
+                <a:spcPts val="400"/>
+              </a:spcAft>
+              <a:buClr>
+                <a:schemeClr val="accent1"/>
+              </a:buClr>
+              <a:buFont typeface="Calibri" pitchFamily="34" charset="0"/>
+              <a:buChar char="◦"/>
+              <a:defRPr sz="1400" kern="1200">
+                <a:solidFill>
+                  <a:schemeClr val="tx1">
+                    <a:lumMod val="75000"/>
+                    <a:lumOff val="25000"/>
+                  </a:schemeClr>
+                </a:solidFill>
+                <a:latin typeface="+mn-lt"/>
+                <a:ea typeface="+mn-ea"/>
+                <a:cs typeface="+mn-cs"/>
+              </a:defRPr>
+            </a:lvl3pPr>
+            <a:lvl4pPr marL="749808" indent="-182880" algn="l" defTabSz="914400" rtl="0" eaLnBrk="1" latinLnBrk="0" hangingPunct="1">
+              <a:lnSpc>
+                <a:spcPct val="90000"/>
+              </a:lnSpc>
+              <a:spcBef>
+                <a:spcPts val="200"/>
+              </a:spcBef>
+              <a:spcAft>
+                <a:spcPts val="400"/>
+              </a:spcAft>
+              <a:buClr>
+                <a:schemeClr val="accent1"/>
+              </a:buClr>
+              <a:buFont typeface="Calibri" pitchFamily="34" charset="0"/>
+              <a:buChar char="◦"/>
+              <a:defRPr sz="1400" kern="1200">
+                <a:solidFill>
+                  <a:schemeClr val="tx1">
+                    <a:lumMod val="75000"/>
+                    <a:lumOff val="25000"/>
+                  </a:schemeClr>
+                </a:solidFill>
+                <a:latin typeface="+mn-lt"/>
+                <a:ea typeface="+mn-ea"/>
+                <a:cs typeface="+mn-cs"/>
+              </a:defRPr>
+            </a:lvl4pPr>
+            <a:lvl5pPr marL="932688" indent="-182880" algn="l" defTabSz="914400" rtl="0" eaLnBrk="1" latinLnBrk="0" hangingPunct="1">
+              <a:lnSpc>
+                <a:spcPct val="90000"/>
+              </a:lnSpc>
+              <a:spcBef>
+                <a:spcPts val="200"/>
+              </a:spcBef>
+              <a:spcAft>
+                <a:spcPts val="400"/>
+              </a:spcAft>
+              <a:buClr>
+                <a:schemeClr val="accent1"/>
+              </a:buClr>
+              <a:buFont typeface="Calibri" pitchFamily="34" charset="0"/>
+              <a:buChar char="◦"/>
+              <a:defRPr sz="1400" kern="1200">
+                <a:solidFill>
+                  <a:schemeClr val="tx1">
+                    <a:lumMod val="75000"/>
+                    <a:lumOff val="25000"/>
+                  </a:schemeClr>
+                </a:solidFill>
+                <a:latin typeface="+mn-lt"/>
+                <a:ea typeface="+mn-ea"/>
+                <a:cs typeface="+mn-cs"/>
+              </a:defRPr>
+            </a:lvl5pPr>
+            <a:lvl6pPr marL="1100000" indent="-228600" algn="l" defTabSz="914400" rtl="0" eaLnBrk="1" latinLnBrk="0" hangingPunct="1">
+              <a:lnSpc>
+                <a:spcPct val="90000"/>
+              </a:lnSpc>
+              <a:spcBef>
+                <a:spcPts val="200"/>
+              </a:spcBef>
+              <a:spcAft>
+                <a:spcPts val="400"/>
+              </a:spcAft>
+              <a:buClr>
+                <a:schemeClr val="accent1"/>
+              </a:buClr>
+              <a:buFont typeface="Calibri" pitchFamily="34" charset="0"/>
+              <a:buChar char="◦"/>
+              <a:defRPr sz="1400" kern="1200">
+                <a:solidFill>
+                  <a:schemeClr val="tx1">
+                    <a:lumMod val="75000"/>
+                    <a:lumOff val="25000"/>
+                  </a:schemeClr>
+                </a:solidFill>
+                <a:latin typeface="+mn-lt"/>
+                <a:ea typeface="+mn-ea"/>
+                <a:cs typeface="+mn-cs"/>
+              </a:defRPr>
+            </a:lvl6pPr>
+            <a:lvl7pPr marL="1300000" indent="-228600" algn="l" defTabSz="914400" rtl="0" eaLnBrk="1" latinLnBrk="0" hangingPunct="1">
+              <a:lnSpc>
+                <a:spcPct val="90000"/>
+              </a:lnSpc>
+              <a:spcBef>
+                <a:spcPts val="200"/>
+              </a:spcBef>
+              <a:spcAft>
+                <a:spcPts val="400"/>
+              </a:spcAft>
+              <a:buClr>
+                <a:schemeClr val="accent1"/>
+              </a:buClr>
+              <a:buFont typeface="Calibri" pitchFamily="34" charset="0"/>
+              <a:buChar char="◦"/>
+              <a:defRPr sz="1400" kern="1200">
+                <a:solidFill>
+                  <a:schemeClr val="tx1">
+                    <a:lumMod val="75000"/>
+                    <a:lumOff val="25000"/>
+                  </a:schemeClr>
+                </a:solidFill>
+                <a:latin typeface="+mn-lt"/>
+                <a:ea typeface="+mn-ea"/>
+                <a:cs typeface="+mn-cs"/>
+              </a:defRPr>
+            </a:lvl7pPr>
+            <a:lvl8pPr marL="1500000" indent="-228600" algn="l" defTabSz="914400" rtl="0" eaLnBrk="1" latinLnBrk="0" hangingPunct="1">
+              <a:lnSpc>
+                <a:spcPct val="90000"/>
+              </a:lnSpc>
+              <a:spcBef>
+                <a:spcPts val="200"/>
+              </a:spcBef>
+              <a:spcAft>
+                <a:spcPts val="400"/>
+              </a:spcAft>
+              <a:buClr>
+                <a:schemeClr val="accent1"/>
+              </a:buClr>
+              <a:buFont typeface="Calibri" pitchFamily="34" charset="0"/>
+              <a:buChar char="◦"/>
+              <a:defRPr sz="1400" kern="1200">
+                <a:solidFill>
+                  <a:schemeClr val="tx1">
+                    <a:lumMod val="75000"/>
+                    <a:lumOff val="25000"/>
+                  </a:schemeClr>
+                </a:solidFill>
+                <a:latin typeface="+mn-lt"/>
+                <a:ea typeface="+mn-ea"/>
+                <a:cs typeface="+mn-cs"/>
+              </a:defRPr>
+            </a:lvl8pPr>
+            <a:lvl9pPr marL="1700000" indent="-228600" algn="l" defTabSz="914400" rtl="0" eaLnBrk="1" latinLnBrk="0" hangingPunct="1">
+              <a:lnSpc>
+                <a:spcPct val="90000"/>
+              </a:lnSpc>
+              <a:spcBef>
+                <a:spcPts val="200"/>
+              </a:spcBef>
+              <a:spcAft>
+                <a:spcPts val="400"/>
+              </a:spcAft>
+              <a:buClr>
+                <a:schemeClr val="accent1"/>
+              </a:buClr>
+              <a:buFont typeface="Calibri" pitchFamily="34" charset="0"/>
+              <a:buChar char="◦"/>
+              <a:defRPr sz="1400" kern="1200">
+                <a:solidFill>
+                  <a:schemeClr val="tx1">
+                    <a:lumMod val="75000"/>
+                    <a:lumOff val="25000"/>
+                  </a:schemeClr>
+                </a:solidFill>
+                <a:latin typeface="+mn-lt"/>
+                <a:ea typeface="+mn-ea"/>
+                <a:cs typeface="+mn-cs"/>
+              </a:defRPr>
+            </a:lvl9pPr>
+          </a:lstStyle>
           <a:p>
             <a:pPr marL="358775" indent="-358775">
               <a:buFont typeface="Arial" panose="020B0604020202020204" pitchFamily="34" charset="0"/>
@@ -7735,7 +8046,7 @@
             </a:pPr>
             <a:r>
               <a:rPr lang="en-US" sz="2600" dirty="0"/>
-              <a:t>Mid-Level Representation</a:t>
+              <a:t>Mid-Level Representations</a:t>
             </a:r>
           </a:p>
           <a:p>
@@ -7758,12 +8069,19 @@
               <a:t>Resynthesis</a:t>
             </a:r>
           </a:p>
+          <a:p>
+            <a:pPr>
+              <a:buFont typeface="Courier New" panose="02070309020205020404" pitchFamily="49" charset="0"/>
+              <a:buChar char="o"/>
+            </a:pPr>
+            <a:endParaRPr lang="cs-CZ" dirty="0"/>
+          </a:p>
         </p:txBody>
       </p:sp>
     </p:spTree>
     <p:extLst>
       <p:ext uri="{BB962C8B-B14F-4D97-AF65-F5344CB8AC3E}">
-        <p14:creationId xmlns:p14="http://schemas.microsoft.com/office/powerpoint/2010/main" val="3854896682"/>
+        <p14:creationId xmlns:p14="http://schemas.microsoft.com/office/powerpoint/2010/main" val="2829028738"/>
       </p:ext>
     </p:extLst>
   </p:cSld>
@@ -7921,7 +8239,7 @@
           <a:p>
             <a:r>
               <a:rPr lang="en-US" sz="4000" dirty="0"/>
-              <a:t>Correlogram and the Extracted Features</a:t>
+              <a:t>Feature Extraction</a:t>
             </a:r>
             <a:endParaRPr lang="cs-CZ" sz="4000" dirty="0"/>
           </a:p>

</xml_diff>

<commit_message>
Presentation update for the defense
</commit_message>
<xml_diff>
--- a/presentation/presentation.pptx
+++ b/presentation/presentation.pptx
@@ -15,10 +15,11 @@
     <p:sldId id="263" r:id="rId9"/>
     <p:sldId id="264" r:id="rId10"/>
     <p:sldId id="265" r:id="rId11"/>
-    <p:sldId id="271" r:id="rId12"/>
-    <p:sldId id="272" r:id="rId13"/>
-    <p:sldId id="266" r:id="rId14"/>
-    <p:sldId id="267" r:id="rId15"/>
+    <p:sldId id="273" r:id="rId12"/>
+    <p:sldId id="271" r:id="rId13"/>
+    <p:sldId id="272" r:id="rId14"/>
+    <p:sldId id="266" r:id="rId15"/>
+    <p:sldId id="267" r:id="rId16"/>
   </p:sldIdLst>
   <p:sldSz cx="12192000" cy="6858000"/>
   <p:notesSz cx="6858000" cy="9144000"/>
@@ -3420,7 +3421,7 @@
           <a:p>
             <a:fld id="{CE20EC0F-44AC-4090-9B28-F1AEE8B15CC4}" type="datetimeFigureOut">
               <a:rPr lang="cs-CZ" smtClean="0"/>
-              <a:t>05.06.2022</a:t>
+              <a:t>21.06.2022</a:t>
             </a:fld>
             <a:endParaRPr lang="cs-CZ"/>
           </a:p>
@@ -3628,7 +3629,7 @@
           <a:p>
             <a:fld id="{CE20EC0F-44AC-4090-9B28-F1AEE8B15CC4}" type="datetimeFigureOut">
               <a:rPr lang="cs-CZ" smtClean="0"/>
-              <a:t>05.06.2022</a:t>
+              <a:t>21.06.2022</a:t>
             </a:fld>
             <a:endParaRPr lang="cs-CZ"/>
           </a:p>
@@ -3884,7 +3885,7 @@
           <a:p>
             <a:fld id="{CE20EC0F-44AC-4090-9B28-F1AEE8B15CC4}" type="datetimeFigureOut">
               <a:rPr lang="cs-CZ" smtClean="0"/>
-              <a:t>05.06.2022</a:t>
+              <a:t>21.06.2022</a:t>
             </a:fld>
             <a:endParaRPr lang="cs-CZ"/>
           </a:p>
@@ -4058,7 +4059,7 @@
           <a:p>
             <a:fld id="{CE20EC0F-44AC-4090-9B28-F1AEE8B15CC4}" type="datetimeFigureOut">
               <a:rPr lang="cs-CZ" smtClean="0"/>
-              <a:t>05.06.2022</a:t>
+              <a:t>21.06.2022</a:t>
             </a:fld>
             <a:endParaRPr lang="cs-CZ"/>
           </a:p>
@@ -4401,7 +4402,7 @@
           <a:p>
             <a:fld id="{CE20EC0F-44AC-4090-9B28-F1AEE8B15CC4}" type="datetimeFigureOut">
               <a:rPr lang="cs-CZ" smtClean="0"/>
-              <a:t>05.06.2022</a:t>
+              <a:t>21.06.2022</a:t>
             </a:fld>
             <a:endParaRPr lang="cs-CZ"/>
           </a:p>
@@ -4676,7 +4677,7 @@
           <a:p>
             <a:fld id="{CE20EC0F-44AC-4090-9B28-F1AEE8B15CC4}" type="datetimeFigureOut">
               <a:rPr lang="cs-CZ" smtClean="0"/>
-              <a:t>05.06.2022</a:t>
+              <a:t>21.06.2022</a:t>
             </a:fld>
             <a:endParaRPr lang="cs-CZ"/>
           </a:p>
@@ -5055,7 +5056,7 @@
           <a:p>
             <a:fld id="{CE20EC0F-44AC-4090-9B28-F1AEE8B15CC4}" type="datetimeFigureOut">
               <a:rPr lang="cs-CZ" smtClean="0"/>
-              <a:t>05.06.2022</a:t>
+              <a:t>21.06.2022</a:t>
             </a:fld>
             <a:endParaRPr lang="cs-CZ"/>
           </a:p>
@@ -5173,7 +5174,7 @@
           <a:p>
             <a:fld id="{CE20EC0F-44AC-4090-9B28-F1AEE8B15CC4}" type="datetimeFigureOut">
               <a:rPr lang="cs-CZ" smtClean="0"/>
-              <a:t>05.06.2022</a:t>
+              <a:t>21.06.2022</a:t>
             </a:fld>
             <a:endParaRPr lang="cs-CZ"/>
           </a:p>
@@ -5344,7 +5345,7 @@
           <a:p>
             <a:fld id="{CE20EC0F-44AC-4090-9B28-F1AEE8B15CC4}" type="datetimeFigureOut">
               <a:rPr lang="cs-CZ" smtClean="0"/>
-              <a:t>05.06.2022</a:t>
+              <a:t>21.06.2022</a:t>
             </a:fld>
             <a:endParaRPr lang="cs-CZ"/>
           </a:p>
@@ -5698,7 +5699,7 @@
           <a:p>
             <a:fld id="{CE20EC0F-44AC-4090-9B28-F1AEE8B15CC4}" type="datetimeFigureOut">
               <a:rPr lang="cs-CZ" smtClean="0"/>
-              <a:t>05.06.2022</a:t>
+              <a:t>21.06.2022</a:t>
             </a:fld>
             <a:endParaRPr lang="cs-CZ"/>
           </a:p>
@@ -6080,7 +6081,7 @@
           <a:p>
             <a:fld id="{CE20EC0F-44AC-4090-9B28-F1AEE8B15CC4}" type="datetimeFigureOut">
               <a:rPr lang="cs-CZ" smtClean="0"/>
-              <a:t>05.06.2022</a:t>
+              <a:t>21.06.2022</a:t>
             </a:fld>
             <a:endParaRPr lang="cs-CZ"/>
           </a:p>
@@ -6367,7 +6368,7 @@
           <a:p>
             <a:fld id="{CE20EC0F-44AC-4090-9B28-F1AEE8B15CC4}" type="datetimeFigureOut">
               <a:rPr lang="cs-CZ" smtClean="0"/>
-              <a:t>05.06.2022</a:t>
+              <a:t>21.06.2022</a:t>
             </a:fld>
             <a:endParaRPr lang="cs-CZ"/>
           </a:p>
@@ -7261,6 +7262,162 @@
       </p:grpSpPr>
       <p:sp>
         <p:nvSpPr>
+          <p:cNvPr id="2" name="Title 1">
+            <a:extLst>
+              <a:ext uri="{FF2B5EF4-FFF2-40B4-BE49-F238E27FC236}">
+                <a16:creationId xmlns:a16="http://schemas.microsoft.com/office/drawing/2014/main" id="{91319FF4-6EF9-BC0D-5597-3A2F4C53EA25}"/>
+              </a:ext>
+            </a:extLst>
+          </p:cNvPr>
+          <p:cNvSpPr>
+            <a:spLocks noGrp="1"/>
+          </p:cNvSpPr>
+          <p:nvPr>
+            <p:ph type="title"/>
+          </p:nvPr>
+        </p:nvSpPr>
+        <p:spPr/>
+        <p:txBody>
+          <a:bodyPr/>
+          <a:lstStyle/>
+          <a:p>
+            <a:r>
+              <a:rPr lang="en-US" dirty="0"/>
+              <a:t>Dataset</a:t>
+            </a:r>
+            <a:endParaRPr lang="cs-CZ" dirty="0"/>
+          </a:p>
+        </p:txBody>
+      </p:sp>
+      <p:sp>
+        <p:nvSpPr>
+          <p:cNvPr id="4" name="Content Placeholder 2">
+            <a:extLst>
+              <a:ext uri="{FF2B5EF4-FFF2-40B4-BE49-F238E27FC236}">
+                <a16:creationId xmlns:a16="http://schemas.microsoft.com/office/drawing/2014/main" id="{6C894952-2F70-A8BD-9C35-E4CCFA8F8022}"/>
+              </a:ext>
+            </a:extLst>
+          </p:cNvPr>
+          <p:cNvSpPr>
+            <a:spLocks noGrp="1"/>
+          </p:cNvSpPr>
+          <p:nvPr>
+            <p:ph idx="1"/>
+          </p:nvPr>
+        </p:nvSpPr>
+        <p:spPr>
+          <a:xfrm>
+            <a:off x="1097280" y="2101372"/>
+            <a:ext cx="10058400" cy="4023360"/>
+          </a:xfrm>
+        </p:spPr>
+        <p:txBody>
+          <a:bodyPr>
+            <a:normAutofit/>
+          </a:bodyPr>
+          <a:lstStyle/>
+          <a:p>
+            <a:pPr marL="354013" indent="-354013">
+              <a:buFont typeface="Arial" panose="020B0604020202020204" pitchFamily="34" charset="0"/>
+              <a:buChar char="•"/>
+            </a:pPr>
+            <a:r>
+              <a:rPr lang="en-US" sz="2400" dirty="0"/>
+              <a:t>34 piano recordings stored as two channels in WAV files</a:t>
+            </a:r>
+          </a:p>
+          <a:p>
+            <a:pPr marL="354013" indent="-354013">
+              <a:buFont typeface="Arial" panose="020B0604020202020204" pitchFamily="34" charset="0"/>
+              <a:buChar char="•"/>
+            </a:pPr>
+            <a:r>
+              <a:rPr lang="en-US" sz="2400" dirty="0"/>
+              <a:t>Various major and minor scales in different modes</a:t>
+            </a:r>
+          </a:p>
+          <a:p>
+            <a:pPr marL="354013" indent="-354013">
+              <a:buFont typeface="Arial" panose="020B0604020202020204" pitchFamily="34" charset="0"/>
+              <a:buChar char="•"/>
+            </a:pPr>
+            <a:r>
+              <a:rPr lang="en-US" sz="2400" dirty="0"/>
+              <a:t>Perfect melodic fourths and octaves</a:t>
+            </a:r>
+          </a:p>
+          <a:p>
+            <a:pPr marL="354013" indent="-354013">
+              <a:buFont typeface="Arial" panose="020B0604020202020204" pitchFamily="34" charset="0"/>
+              <a:buChar char="•"/>
+            </a:pPr>
+            <a:r>
+              <a:rPr lang="en-US" sz="2400" dirty="0"/>
+              <a:t>All piano keys one after another in different octaves</a:t>
+            </a:r>
+          </a:p>
+          <a:p>
+            <a:pPr marL="354013" indent="-354013">
+              <a:buFont typeface="Arial" panose="020B0604020202020204" pitchFamily="34" charset="0"/>
+              <a:buChar char="•"/>
+            </a:pPr>
+            <a:endParaRPr lang="en-US" sz="2400" dirty="0"/>
+          </a:p>
+          <a:p>
+            <a:pPr marL="354013" indent="-354013">
+              <a:buFont typeface="Arial" panose="020B0604020202020204" pitchFamily="34" charset="0"/>
+              <a:buChar char="•"/>
+            </a:pPr>
+            <a:r>
+              <a:rPr lang="en-US" sz="2400" dirty="0"/>
+              <a:t>36 background sounds: clanging, grinding, rattling, etc.</a:t>
+            </a:r>
+          </a:p>
+          <a:p>
+            <a:pPr marL="354013" indent="-354013">
+              <a:buFont typeface="Arial" panose="020B0604020202020204" pitchFamily="34" charset="0"/>
+              <a:buChar char="•"/>
+            </a:pPr>
+            <a:r>
+              <a:rPr lang="en-US" sz="2400" dirty="0"/>
+              <a:t>Rustling paper or a plastic bag, ticking lock, clatter of kitchen utensils…</a:t>
+            </a:r>
+            <a:endParaRPr lang="cs-CZ" sz="2400" dirty="0"/>
+          </a:p>
+        </p:txBody>
+      </p:sp>
+    </p:spTree>
+    <p:extLst>
+      <p:ext uri="{BB962C8B-B14F-4D97-AF65-F5344CB8AC3E}">
+        <p14:creationId xmlns:p14="http://schemas.microsoft.com/office/powerpoint/2010/main" val="1086005468"/>
+      </p:ext>
+    </p:extLst>
+  </p:cSld>
+  <p:clrMapOvr>
+    <a:masterClrMapping/>
+  </p:clrMapOvr>
+</p:sld>
+</file>
+
+<file path=ppt/slides/slide12.xml><?xml version="1.0" encoding="utf-8"?>
+<p:sld xmlns:a="http://schemas.openxmlformats.org/drawingml/2006/main" xmlns:r="http://schemas.openxmlformats.org/officeDocument/2006/relationships" xmlns:p="http://schemas.openxmlformats.org/presentationml/2006/main">
+  <p:cSld>
+    <p:spTree>
+      <p:nvGrpSpPr>
+        <p:cNvPr id="1" name=""/>
+        <p:cNvGrpSpPr/>
+        <p:nvPr/>
+      </p:nvGrpSpPr>
+      <p:grpSpPr>
+        <a:xfrm>
+          <a:off x="0" y="0"/>
+          <a:ext cx="0" cy="0"/>
+          <a:chOff x="0" y="0"/>
+          <a:chExt cx="0" cy="0"/>
+        </a:xfrm>
+      </p:grpSpPr>
+      <p:sp>
+        <p:nvSpPr>
           <p:cNvPr id="4" name="Rectangle 3">
             <a:extLst>
               <a:ext uri="{FF2B5EF4-FFF2-40B4-BE49-F238E27FC236}">
@@ -7663,7 +7820,7 @@
 </p:sld>
 </file>
 
-<file path=ppt/slides/slide12.xml><?xml version="1.0" encoding="utf-8"?>
+<file path=ppt/slides/slide13.xml><?xml version="1.0" encoding="utf-8"?>
 <p:sld xmlns:a="http://schemas.openxmlformats.org/drawingml/2006/main" xmlns:r="http://schemas.openxmlformats.org/officeDocument/2006/relationships" xmlns:p="http://schemas.openxmlformats.org/presentationml/2006/main">
   <p:cSld>
     <p:spTree>
@@ -8247,7 +8404,7 @@
 </p:sld>
 </file>
 
-<file path=ppt/slides/slide13.xml><?xml version="1.0" encoding="utf-8"?>
+<file path=ppt/slides/slide14.xml><?xml version="1.0" encoding="utf-8"?>
 <p:sld xmlns:a="http://schemas.openxmlformats.org/drawingml/2006/main" xmlns:r="http://schemas.openxmlformats.org/officeDocument/2006/relationships" xmlns:p="http://schemas.openxmlformats.org/presentationml/2006/main">
   <p:cSld>
     <p:bg>
@@ -8492,7 +8649,7 @@
 </p:sld>
 </file>
 
-<file path=ppt/slides/slide14.xml><?xml version="1.0" encoding="utf-8"?>
+<file path=ppt/slides/slide15.xml><?xml version="1.0" encoding="utf-8"?>
 <p:sld xmlns:a="http://schemas.openxmlformats.org/drawingml/2006/main" xmlns:r="http://schemas.openxmlformats.org/officeDocument/2006/relationships" xmlns:p="http://schemas.openxmlformats.org/presentationml/2006/main">
   <p:cSld>
     <p:spTree>
@@ -8556,8 +8713,8 @@
         </p:nvSpPr>
         <p:spPr>
           <a:xfrm>
-            <a:off x="1097280" y="2548037"/>
-            <a:ext cx="10058400" cy="4023360"/>
+            <a:off x="1097280" y="2438402"/>
+            <a:ext cx="9511726" cy="4213123"/>
           </a:xfrm>
         </p:spPr>
         <p:txBody>
@@ -8571,9 +8728,80 @@
               <a:buChar char="•"/>
             </a:pPr>
             <a:r>
-              <a:rPr lang="en-US" sz="2600" dirty="0"/>
-              <a:t>One</a:t>
-            </a:r>
+              <a:rPr lang="en-US" sz="2800" dirty="0"/>
+              <a:t>Which further extensions/improvements would you suggest for your model?</a:t>
+            </a:r>
+            <a:br>
+              <a:rPr lang="en-US" sz="2800" dirty="0"/>
+            </a:br>
+            <a:r>
+              <a:rPr lang="en-US" sz="2800" dirty="0"/>
+              <a:t>(“</a:t>
+            </a:r>
+            <a:r>
+              <a:rPr lang="en-US" sz="2400" i="1" dirty="0" err="1"/>
+              <a:t>Jaké</a:t>
+            </a:r>
+            <a:r>
+              <a:rPr lang="en-US" sz="2400" i="1" dirty="0"/>
+              <a:t> </a:t>
+            </a:r>
+            <a:r>
+              <a:rPr lang="en-US" sz="2400" i="1" dirty="0" err="1"/>
+              <a:t>další</a:t>
+            </a:r>
+            <a:r>
+              <a:rPr lang="en-US" sz="2400" i="1" dirty="0"/>
+              <a:t> </a:t>
+            </a:r>
+            <a:r>
+              <a:rPr lang="en-US" sz="2400" i="1" dirty="0" err="1"/>
+              <a:t>možnosti</a:t>
+            </a:r>
+            <a:r>
+              <a:rPr lang="en-US" sz="2400" i="1" dirty="0"/>
+              <a:t> </a:t>
+            </a:r>
+            <a:r>
+              <a:rPr lang="en-US" sz="2400" i="1" dirty="0" err="1"/>
+              <a:t>rozšíření</a:t>
+            </a:r>
+            <a:r>
+              <a:rPr lang="en-US" sz="2400" i="1" dirty="0"/>
+              <a:t> </a:t>
+            </a:r>
+            <a:r>
+              <a:rPr lang="en-US" sz="2400" i="1" dirty="0" err="1"/>
+              <a:t>byste</a:t>
+            </a:r>
+            <a:r>
+              <a:rPr lang="en-US" sz="2400" i="1" dirty="0"/>
+              <a:t> </a:t>
+            </a:r>
+            <a:r>
+              <a:rPr lang="en-US" sz="2400" i="1" dirty="0" err="1"/>
+              <a:t>navrhl</a:t>
+            </a:r>
+            <a:r>
+              <a:rPr lang="en-US" sz="2400" i="1" dirty="0"/>
+              <a:t> pro </a:t>
+            </a:r>
+            <a:r>
+              <a:rPr lang="en-US" sz="2400" i="1" dirty="0" err="1"/>
+              <a:t>Váš</a:t>
+            </a:r>
+            <a:r>
+              <a:rPr lang="en-US" sz="2400" i="1" dirty="0"/>
+              <a:t> model?</a:t>
+            </a:r>
+            <a:r>
+              <a:rPr lang="en-US" sz="2800" dirty="0"/>
+              <a:t>”)</a:t>
+            </a:r>
+            <a:br>
+              <a:rPr lang="en-US" sz="2800" dirty="0"/>
+            </a:br>
+            <a:endParaRPr lang="en-US" sz="2800" dirty="0"/>
           </a:p>
           <a:p>
             <a:pPr marL="354013" indent="-354013">
@@ -8581,20 +8809,61 @@
               <a:buChar char="•"/>
             </a:pPr>
             <a:r>
-              <a:rPr lang="en-US" sz="2600" dirty="0"/>
-              <a:t>Two</a:t>
-            </a:r>
-          </a:p>
-          <a:p>
-            <a:pPr marL="354013" indent="-354013">
-              <a:buFont typeface="Arial" panose="020B0604020202020204" pitchFamily="34" charset="0"/>
-              <a:buChar char="•"/>
-            </a:pPr>
-            <a:r>
-              <a:rPr lang="en-US" sz="2600" dirty="0"/>
-              <a:t>Three</a:t>
-            </a:r>
-            <a:endParaRPr lang="cs-CZ" sz="2600" dirty="0"/>
+              <a:rPr lang="en-US" sz="2800" dirty="0"/>
+              <a:t>Where do you see its further use?</a:t>
+            </a:r>
+            <a:br>
+              <a:rPr lang="en-US" sz="2400" dirty="0"/>
+            </a:br>
+            <a:r>
+              <a:rPr lang="en-US" sz="2800" dirty="0"/>
+              <a:t>(“</a:t>
+            </a:r>
+            <a:r>
+              <a:rPr lang="en-US" sz="2400" i="1" dirty="0" err="1"/>
+              <a:t>Kde</a:t>
+            </a:r>
+            <a:r>
+              <a:rPr lang="en-US" sz="2400" i="1" dirty="0"/>
+              <a:t> </a:t>
+            </a:r>
+            <a:r>
+              <a:rPr lang="en-US" sz="2400" i="1" dirty="0" err="1"/>
+              <a:t>spatřujete</a:t>
+            </a:r>
+            <a:r>
+              <a:rPr lang="en-US" sz="2400" i="1" dirty="0"/>
+              <a:t> </a:t>
+            </a:r>
+            <a:r>
+              <a:rPr lang="en-US" sz="2400" i="1" dirty="0" err="1"/>
+              <a:t>jeho</a:t>
+            </a:r>
+            <a:r>
+              <a:rPr lang="en-US" sz="2400" i="1" dirty="0"/>
+              <a:t> </a:t>
+            </a:r>
+            <a:r>
+              <a:rPr lang="en-US" sz="2400" i="1" dirty="0" err="1"/>
+              <a:t>další</a:t>
+            </a:r>
+            <a:r>
+              <a:rPr lang="en-US" sz="2400" i="1" dirty="0"/>
+              <a:t> </a:t>
+            </a:r>
+            <a:r>
+              <a:rPr lang="en-US" sz="2400" i="1" dirty="0" err="1"/>
+              <a:t>využití</a:t>
+            </a:r>
+            <a:r>
+              <a:rPr lang="en-US" sz="2400" i="1" dirty="0"/>
+              <a:t>?</a:t>
+            </a:r>
+            <a:r>
+              <a:rPr lang="en-US" sz="2800" dirty="0"/>
+              <a:t>”)</a:t>
+            </a:r>
+            <a:endParaRPr lang="cs-CZ" sz="2800" dirty="0"/>
           </a:p>
         </p:txBody>
       </p:sp>

</xml_diff>